<commit_message>
atulização do power point
</commit_message>
<xml_diff>
--- a/Universo Azul.pptx
+++ b/Universo Azul.pptx
@@ -5,21 +5,22 @@
     <p:sldMasterId id="2147483660" r:id="rId1"/>
   </p:sldMasterIdLst>
   <p:notesMasterIdLst>
-    <p:notesMasterId r:id="rId14"/>
+    <p:notesMasterId r:id="rId15"/>
   </p:notesMasterIdLst>
   <p:sldIdLst>
     <p:sldId id="256" r:id="rId2"/>
     <p:sldId id="261" r:id="rId3"/>
     <p:sldId id="271" r:id="rId4"/>
-    <p:sldId id="258" r:id="rId5"/>
-    <p:sldId id="259" r:id="rId6"/>
-    <p:sldId id="270" r:id="rId7"/>
-    <p:sldId id="257" r:id="rId8"/>
-    <p:sldId id="268" r:id="rId9"/>
-    <p:sldId id="269" r:id="rId10"/>
-    <p:sldId id="262" r:id="rId11"/>
-    <p:sldId id="263" r:id="rId12"/>
-    <p:sldId id="267" r:id="rId13"/>
+    <p:sldId id="272" r:id="rId5"/>
+    <p:sldId id="258" r:id="rId6"/>
+    <p:sldId id="259" r:id="rId7"/>
+    <p:sldId id="270" r:id="rId8"/>
+    <p:sldId id="257" r:id="rId9"/>
+    <p:sldId id="268" r:id="rId10"/>
+    <p:sldId id="269" r:id="rId11"/>
+    <p:sldId id="262" r:id="rId12"/>
+    <p:sldId id="263" r:id="rId13"/>
+    <p:sldId id="267" r:id="rId14"/>
   </p:sldIdLst>
   <p:sldSz cx="9144000" cy="6858000" type="screen4x3"/>
   <p:notesSz cx="6858000" cy="9144000"/>
@@ -5435,10 +5436,119 @@
       </p:grpSpPr>
       <p:sp>
         <p:nvSpPr>
+          <p:cNvPr id="2" name="Título 1"/>
+          <p:cNvSpPr>
+            <a:spLocks noGrp="1"/>
+          </p:cNvSpPr>
+          <p:nvPr>
+            <p:ph type="title"/>
+          </p:nvPr>
+        </p:nvSpPr>
+        <p:spPr/>
+        <p:txBody>
+          <a:bodyPr/>
+          <a:lstStyle/>
+          <a:p>
+            <a:endParaRPr lang="pt-BR"/>
+          </a:p>
+        </p:txBody>
+      </p:sp>
+      <p:sp>
+        <p:nvSpPr>
+          <p:cNvPr id="3" name="Espaço Reservado para Conteúdo 2"/>
+          <p:cNvSpPr>
+            <a:spLocks noGrp="1"/>
+          </p:cNvSpPr>
+          <p:nvPr>
+            <p:ph idx="1"/>
+          </p:nvPr>
+        </p:nvSpPr>
+        <p:spPr/>
+        <p:txBody>
+          <a:bodyPr/>
+          <a:lstStyle/>
+          <a:p>
+            <a:endParaRPr lang="pt-BR"/>
+          </a:p>
+        </p:txBody>
+      </p:sp>
+      <p:pic>
+        <p:nvPicPr>
+          <p:cNvPr id="8194" name="Picture 2" descr="C:\Users\Street_Labs\Desktop\Sem título3.png"/>
+          <p:cNvPicPr>
+            <a:picLocks noChangeAspect="1" noChangeArrowheads="1"/>
+          </p:cNvPicPr>
+          <p:nvPr/>
+        </p:nvPicPr>
+        <p:blipFill>
+          <a:blip r:embed="rId2">
+            <a:extLst>
+              <a:ext uri="{28A0092B-C50C-407E-A947-70E740481C1C}">
+                <a14:useLocalDpi xmlns:a14="http://schemas.microsoft.com/office/drawing/2010/main" val="0"/>
+              </a:ext>
+            </a:extLst>
+          </a:blip>
+          <a:srcRect/>
+          <a:stretch>
+            <a:fillRect/>
+          </a:stretch>
+        </p:blipFill>
+        <p:spPr bwMode="auto">
+          <a:xfrm>
+            <a:off x="484965" y="1449252"/>
+            <a:ext cx="8319594" cy="4682132"/>
+          </a:xfrm>
+          <a:prstGeom prst="rect">
+            <a:avLst/>
+          </a:prstGeom>
+          <a:noFill/>
+          <a:extLst>
+            <a:ext uri="{909E8E84-426E-40DD-AFC4-6F175D3DCCD1}">
+              <a14:hiddenFill xmlns:a14="http://schemas.microsoft.com/office/drawing/2010/main">
+                <a:solidFill>
+                  <a:srgbClr val="FFFFFF"/>
+                </a:solidFill>
+              </a14:hiddenFill>
+            </a:ext>
+          </a:extLst>
+        </p:spPr>
+      </p:pic>
+    </p:spTree>
+    <p:extLst>
+      <p:ext uri="{BB962C8B-B14F-4D97-AF65-F5344CB8AC3E}">
+        <p14:creationId xmlns:p14="http://schemas.microsoft.com/office/powerpoint/2010/main" val="2594684981"/>
+      </p:ext>
+    </p:extLst>
+  </p:cSld>
+  <p:clrMapOvr>
+    <a:masterClrMapping/>
+  </p:clrMapOvr>
+</p:sld>
+</file>
+
+<file path=ppt/slides/slide11.xml><?xml version="1.0" encoding="utf-8"?>
+<p:sld xmlns:a="http://schemas.openxmlformats.org/drawingml/2006/main" xmlns:r="http://schemas.openxmlformats.org/officeDocument/2006/relationships" xmlns:p="http://schemas.openxmlformats.org/presentationml/2006/main">
+  <p:cSld>
+    <p:spTree>
+      <p:nvGrpSpPr>
+        <p:cNvPr id="1" name=""/>
+        <p:cNvGrpSpPr/>
+        <p:nvPr/>
+      </p:nvGrpSpPr>
+      <p:grpSpPr>
+        <a:xfrm>
+          <a:off x="0" y="0"/>
+          <a:ext cx="0" cy="0"/>
+          <a:chOff x="0" y="0"/>
+          <a:chExt cx="0" cy="0"/>
+        </a:xfrm>
+      </p:grpSpPr>
+      <p:sp>
+        <p:nvSpPr>
           <p:cNvPr id="2" name="Título 1">
             <a:extLst>
               <a:ext uri="{FF2B5EF4-FFF2-40B4-BE49-F238E27FC236}">
-                <a16:creationId xmlns="" xmlns:a16="http://schemas.microsoft.com/office/drawing/2014/main" id="{7D48BFB6-119F-4E05-B15F-97AB8EE6D641}"/>
+                <a16:creationId xmlns:a16="http://schemas.microsoft.com/office/drawing/2014/main" xmlns="" id="{7D48BFB6-119F-4E05-B15F-97AB8EE6D641}"/>
               </a:ext>
             </a:extLst>
           </p:cNvPr>
@@ -5579,7 +5689,7 @@
 </p:sld>
 </file>
 
-<file path=ppt/slides/slide11.xml><?xml version="1.0" encoding="utf-8"?>
+<file path=ppt/slides/slide12.xml><?xml version="1.0" encoding="utf-8"?>
 <p:sld xmlns:a="http://schemas.openxmlformats.org/drawingml/2006/main" xmlns:r="http://schemas.openxmlformats.org/officeDocument/2006/relationships" xmlns:p="http://schemas.openxmlformats.org/presentationml/2006/main">
   <p:cSld>
     <p:spTree>
@@ -5601,7 +5711,7 @@
           <p:cNvPr id="2" name="Título 1">
             <a:extLst>
               <a:ext uri="{FF2B5EF4-FFF2-40B4-BE49-F238E27FC236}">
-                <a16:creationId xmlns="" xmlns:a16="http://schemas.microsoft.com/office/drawing/2014/main" id="{DCB0B82E-20BA-4B45-A92D-356EBA4D5881}"/>
+                <a16:creationId xmlns:a16="http://schemas.microsoft.com/office/drawing/2014/main" xmlns="" id="{DCB0B82E-20BA-4B45-A92D-356EBA4D5881}"/>
               </a:ext>
             </a:extLst>
           </p:cNvPr>
@@ -5742,7 +5852,7 @@
 </p:sld>
 </file>
 
-<file path=ppt/slides/slide12.xml><?xml version="1.0" encoding="utf-8"?>
+<file path=ppt/slides/slide13.xml><?xml version="1.0" encoding="utf-8"?>
 <p:sld xmlns:a="http://schemas.openxmlformats.org/drawingml/2006/main" xmlns:r="http://schemas.openxmlformats.org/officeDocument/2006/relationships" xmlns:p="http://schemas.openxmlformats.org/presentationml/2006/main">
   <p:cSld>
     <p:spTree>
@@ -5764,7 +5874,7 @@
           <p:cNvPr id="2" name="CaixaDeTexto 1">
             <a:extLst>
               <a:ext uri="{FF2B5EF4-FFF2-40B4-BE49-F238E27FC236}">
-                <a16:creationId xmlns="" xmlns:a16="http://schemas.microsoft.com/office/drawing/2014/main" id="{0406BE30-5AE0-46B8-9BBB-F057C0C966FB}"/>
+                <a16:creationId xmlns:a16="http://schemas.microsoft.com/office/drawing/2014/main" xmlns="" id="{0406BE30-5AE0-46B8-9BBB-F057C0C966FB}"/>
               </a:ext>
             </a:extLst>
           </p:cNvPr>
@@ -5799,7 +5909,7 @@
           <p:cNvPr id="3" name="CaixaDeTexto 2">
             <a:extLst>
               <a:ext uri="{FF2B5EF4-FFF2-40B4-BE49-F238E27FC236}">
-                <a16:creationId xmlns="" xmlns:a16="http://schemas.microsoft.com/office/drawing/2014/main" id="{EEAA1C53-0734-4807-A924-605404E45A01}"/>
+                <a16:creationId xmlns:a16="http://schemas.microsoft.com/office/drawing/2014/main" xmlns="" id="{EEAA1C53-0734-4807-A924-605404E45A01}"/>
               </a:ext>
             </a:extLst>
           </p:cNvPr>
@@ -5926,7 +6036,7 @@
           <a:graphicData uri="http://schemas.openxmlformats.org/presentationml/2006/ole">
             <mc:AlternateContent xmlns:mc="http://schemas.openxmlformats.org/markup-compatibility/2006">
               <mc:Choice xmlns:v="urn:schemas-microsoft-com:vml" Requires="v">
-                <p:oleObj spid="_x0000_s5128" name="Objeto de Shell de Gerenciador" showAsIcon="1" r:id="rId3" imgW="2057400" imgH="686880" progId="Package">
+                <p:oleObj spid="_x0000_s5130" name="Objeto de Shell de Gerenciador" showAsIcon="1" r:id="rId3" imgW="2057400" imgH="686880" progId="Package">
                   <p:embed/>
                 </p:oleObj>
               </mc:Choice>
@@ -6022,6 +6132,36 @@
           </a:p>
         </p:txBody>
       </p:sp>
+      <p:pic>
+        <p:nvPicPr>
+          <p:cNvPr id="3" name="Imagem 2"/>
+          <p:cNvPicPr>
+            <a:picLocks noChangeAspect="1"/>
+          </p:cNvPicPr>
+          <p:nvPr/>
+        </p:nvPicPr>
+        <p:blipFill>
+          <a:blip r:embed="rId2">
+            <a:extLst>
+              <a:ext uri="{28A0092B-C50C-407E-A947-70E740481C1C}">
+                <a14:useLocalDpi xmlns:a14="http://schemas.microsoft.com/office/drawing/2010/main" val="0"/>
+              </a:ext>
+            </a:extLst>
+          </a:blip>
+          <a:stretch>
+            <a:fillRect/>
+          </a:stretch>
+        </p:blipFill>
+        <p:spPr>
+          <a:xfrm>
+            <a:off x="945960" y="1124744"/>
+            <a:ext cx="7274940" cy="4845224"/>
+          </a:xfrm>
+          <a:prstGeom prst="rect">
+            <a:avLst/>
+          </a:prstGeom>
+        </p:spPr>
+      </p:pic>
     </p:spTree>
     <p:extLst>
       <p:ext uri="{BB962C8B-B14F-4D97-AF65-F5344CB8AC3E}">
@@ -6069,6 +6209,90 @@
           <a:p>
             <a:pPr algn="ctr"/>
             <a:r>
+              <a:rPr lang="pt-BR" dirty="0" err="1" smtClean="0"/>
+              <a:t>Teorico</a:t>
+            </a:r>
+            <a:endParaRPr lang="pt-BR" dirty="0"/>
+          </a:p>
+        </p:txBody>
+      </p:sp>
+      <p:sp>
+        <p:nvSpPr>
+          <p:cNvPr id="3" name="CaixaDeTexto 2"/>
+          <p:cNvSpPr txBox="1"/>
+          <p:nvPr/>
+        </p:nvSpPr>
+        <p:spPr>
+          <a:xfrm>
+            <a:off x="822960" y="1772816"/>
+            <a:ext cx="7411644" cy="369332"/>
+          </a:xfrm>
+          <a:prstGeom prst="rect">
+            <a:avLst/>
+          </a:prstGeom>
+          <a:noFill/>
+        </p:spPr>
+        <p:txBody>
+          <a:bodyPr wrap="none" rtlCol="0">
+            <a:spAutoFit/>
+          </a:bodyPr>
+          <a:lstStyle/>
+          <a:p>
+            <a:r>
+              <a:rPr lang="pt-BR" dirty="0" smtClean="0"/>
+              <a:t>Ami Klin fala da diferencia entre Transtorno do espectro Autista e Asperger.</a:t>
+            </a:r>
+            <a:endParaRPr lang="pt-BR" dirty="0"/>
+          </a:p>
+        </p:txBody>
+      </p:sp>
+    </p:spTree>
+    <p:extLst>
+      <p:ext uri="{BB962C8B-B14F-4D97-AF65-F5344CB8AC3E}">
+        <p14:creationId xmlns:p14="http://schemas.microsoft.com/office/powerpoint/2010/main" val="1464791005"/>
+      </p:ext>
+    </p:extLst>
+  </p:cSld>
+  <p:clrMapOvr>
+    <a:masterClrMapping/>
+  </p:clrMapOvr>
+</p:sld>
+</file>
+
+<file path=ppt/slides/slide5.xml><?xml version="1.0" encoding="utf-8"?>
+<p:sld xmlns:a="http://schemas.openxmlformats.org/drawingml/2006/main" xmlns:r="http://schemas.openxmlformats.org/officeDocument/2006/relationships" xmlns:p="http://schemas.openxmlformats.org/presentationml/2006/main">
+  <p:cSld>
+    <p:spTree>
+      <p:nvGrpSpPr>
+        <p:cNvPr id="1" name=""/>
+        <p:cNvGrpSpPr/>
+        <p:nvPr/>
+      </p:nvGrpSpPr>
+      <p:grpSpPr>
+        <a:xfrm>
+          <a:off x="0" y="0"/>
+          <a:ext cx="0" cy="0"/>
+          <a:chOff x="0" y="0"/>
+          <a:chExt cx="0" cy="0"/>
+        </a:xfrm>
+      </p:grpSpPr>
+      <p:sp>
+        <p:nvSpPr>
+          <p:cNvPr id="2" name="Título 1"/>
+          <p:cNvSpPr>
+            <a:spLocks noGrp="1"/>
+          </p:cNvSpPr>
+          <p:nvPr>
+            <p:ph type="title"/>
+          </p:nvPr>
+        </p:nvSpPr>
+        <p:spPr/>
+        <p:txBody>
+          <a:bodyPr/>
+          <a:lstStyle/>
+          <a:p>
+            <a:pPr algn="ctr"/>
+            <a:r>
               <a:rPr lang="pt-BR" dirty="0"/>
               <a:t>objetivos gerais</a:t>
             </a:r>
@@ -6130,7 +6354,7 @@
           <p:cNvPr id="5" name="Imagem 4">
             <a:extLst>
               <a:ext uri="{FF2B5EF4-FFF2-40B4-BE49-F238E27FC236}">
-                <a16:creationId xmlns="" xmlns:a16="http://schemas.microsoft.com/office/drawing/2014/main" id="{C2521149-3E40-44A1-BD7D-3C8E9AA3A294}"/>
+                <a16:creationId xmlns:a16="http://schemas.microsoft.com/office/drawing/2014/main" xmlns="" id="{C2521149-3E40-44A1-BD7D-3C8E9AA3A294}"/>
               </a:ext>
             </a:extLst>
           </p:cNvPr>
@@ -6257,7 +6481,7 @@
 </p:sld>
 </file>
 
-<file path=ppt/slides/slide5.xml><?xml version="1.0" encoding="utf-8"?>
+<file path=ppt/slides/slide6.xml><?xml version="1.0" encoding="utf-8"?>
 <p:sld xmlns:a="http://schemas.openxmlformats.org/drawingml/2006/main" xmlns:r="http://schemas.openxmlformats.org/officeDocument/2006/relationships" xmlns:p="http://schemas.openxmlformats.org/presentationml/2006/main">
   <p:cSld>
     <p:spTree>
@@ -6365,7 +6589,7 @@
 </p:sld>
 </file>
 
-<file path=ppt/slides/slide6.xml><?xml version="1.0" encoding="utf-8"?>
+<file path=ppt/slides/slide7.xml><?xml version="1.0" encoding="utf-8"?>
 <p:sld xmlns:a="http://schemas.openxmlformats.org/drawingml/2006/main" xmlns:r="http://schemas.openxmlformats.org/officeDocument/2006/relationships" xmlns:p="http://schemas.openxmlformats.org/presentationml/2006/main">
   <p:cSld>
     <p:spTree>
@@ -6474,7 +6698,7 @@
 </p:sld>
 </file>
 
-<file path=ppt/slides/slide7.xml><?xml version="1.0" encoding="utf-8"?>
+<file path=ppt/slides/slide8.xml><?xml version="1.0" encoding="utf-8"?>
 <p:sld xmlns:a="http://schemas.openxmlformats.org/drawingml/2006/main" xmlns:r="http://schemas.openxmlformats.org/officeDocument/2006/relationships" xmlns:p="http://schemas.openxmlformats.org/presentationml/2006/main">
   <p:cSld>
     <p:spTree>
@@ -6606,7 +6830,7 @@
 </p:sld>
 </file>
 
-<file path=ppt/slides/slide8.xml><?xml version="1.0" encoding="utf-8"?>
+<file path=ppt/slides/slide9.xml><?xml version="1.0" encoding="utf-8"?>
 <p:sld xmlns:a="http://schemas.openxmlformats.org/drawingml/2006/main" xmlns:r="http://schemas.openxmlformats.org/officeDocument/2006/relationships" xmlns:p="http://schemas.openxmlformats.org/presentationml/2006/main">
   <p:cSld>
     <p:spTree>
@@ -6706,115 +6930,6 @@
     <p:extLst>
       <p:ext uri="{BB962C8B-B14F-4D97-AF65-F5344CB8AC3E}">
         <p14:creationId xmlns:p14="http://schemas.microsoft.com/office/powerpoint/2010/main" val="1400708194"/>
-      </p:ext>
-    </p:extLst>
-  </p:cSld>
-  <p:clrMapOvr>
-    <a:masterClrMapping/>
-  </p:clrMapOvr>
-</p:sld>
-</file>
-
-<file path=ppt/slides/slide9.xml><?xml version="1.0" encoding="utf-8"?>
-<p:sld xmlns:a="http://schemas.openxmlformats.org/drawingml/2006/main" xmlns:r="http://schemas.openxmlformats.org/officeDocument/2006/relationships" xmlns:p="http://schemas.openxmlformats.org/presentationml/2006/main">
-  <p:cSld>
-    <p:spTree>
-      <p:nvGrpSpPr>
-        <p:cNvPr id="1" name=""/>
-        <p:cNvGrpSpPr/>
-        <p:nvPr/>
-      </p:nvGrpSpPr>
-      <p:grpSpPr>
-        <a:xfrm>
-          <a:off x="0" y="0"/>
-          <a:ext cx="0" cy="0"/>
-          <a:chOff x="0" y="0"/>
-          <a:chExt cx="0" cy="0"/>
-        </a:xfrm>
-      </p:grpSpPr>
-      <p:sp>
-        <p:nvSpPr>
-          <p:cNvPr id="2" name="Título 1"/>
-          <p:cNvSpPr>
-            <a:spLocks noGrp="1"/>
-          </p:cNvSpPr>
-          <p:nvPr>
-            <p:ph type="title"/>
-          </p:nvPr>
-        </p:nvSpPr>
-        <p:spPr/>
-        <p:txBody>
-          <a:bodyPr/>
-          <a:lstStyle/>
-          <a:p>
-            <a:endParaRPr lang="pt-BR"/>
-          </a:p>
-        </p:txBody>
-      </p:sp>
-      <p:sp>
-        <p:nvSpPr>
-          <p:cNvPr id="3" name="Espaço Reservado para Conteúdo 2"/>
-          <p:cNvSpPr>
-            <a:spLocks noGrp="1"/>
-          </p:cNvSpPr>
-          <p:nvPr>
-            <p:ph idx="1"/>
-          </p:nvPr>
-        </p:nvSpPr>
-        <p:spPr/>
-        <p:txBody>
-          <a:bodyPr/>
-          <a:lstStyle/>
-          <a:p>
-            <a:endParaRPr lang="pt-BR"/>
-          </a:p>
-        </p:txBody>
-      </p:sp>
-      <p:pic>
-        <p:nvPicPr>
-          <p:cNvPr id="8194" name="Picture 2" descr="C:\Users\Street_Labs\Desktop\Sem título3.png"/>
-          <p:cNvPicPr>
-            <a:picLocks noChangeAspect="1" noChangeArrowheads="1"/>
-          </p:cNvPicPr>
-          <p:nvPr/>
-        </p:nvPicPr>
-        <p:blipFill>
-          <a:blip r:embed="rId2">
-            <a:extLst>
-              <a:ext uri="{28A0092B-C50C-407E-A947-70E740481C1C}">
-                <a14:useLocalDpi xmlns:a14="http://schemas.microsoft.com/office/drawing/2010/main" val="0"/>
-              </a:ext>
-            </a:extLst>
-          </a:blip>
-          <a:srcRect/>
-          <a:stretch>
-            <a:fillRect/>
-          </a:stretch>
-        </p:blipFill>
-        <p:spPr bwMode="auto">
-          <a:xfrm>
-            <a:off x="484965" y="1449252"/>
-            <a:ext cx="8319594" cy="4682132"/>
-          </a:xfrm>
-          <a:prstGeom prst="rect">
-            <a:avLst/>
-          </a:prstGeom>
-          <a:noFill/>
-          <a:extLst>
-            <a:ext uri="{909E8E84-426E-40DD-AFC4-6F175D3DCCD1}">
-              <a14:hiddenFill xmlns:a14="http://schemas.microsoft.com/office/drawing/2010/main">
-                <a:solidFill>
-                  <a:srgbClr val="FFFFFF"/>
-                </a:solidFill>
-              </a14:hiddenFill>
-            </a:ext>
-          </a:extLst>
-        </p:spPr>
-      </p:pic>
-    </p:spTree>
-    <p:extLst>
-      <p:ext uri="{BB962C8B-B14F-4D97-AF65-F5344CB8AC3E}">
-        <p14:creationId xmlns:p14="http://schemas.microsoft.com/office/powerpoint/2010/main" val="2594684981"/>
       </p:ext>
     </p:extLst>
   </p:cSld>

</xml_diff>